<commit_message>
Changed lost-drive to m01-lost-drive
</commit_message>
<xml_diff>
--- a/results/m01-lost-drive.pptx
+++ b/results/m01-lost-drive.pptx
@@ -217,7 +217,7 @@
           <a:p>
             <a:fld id="{0F9C1CCF-B725-44A7-AA57-5E433BD85C9F}" type="datetimeFigureOut">
               <a:rPr lang="en-US" smtClean="0"/>
-              <a:t>2/17/2018</a:t>
+              <a:t>4/5/2019</a:t>
             </a:fld>
             <a:endParaRPr lang="en-US"/>
           </a:p>
@@ -2938,7 +2938,7 @@
             </a:r>
             <a:r>
               <a:rPr/>
-              <a:t>peelk</a:t>
+              <a:t>peek</a:t>
             </a:r>
             <a:r>
               <a:rPr/>
@@ -5892,7 +5892,7 @@
           <a:p>
             <a:fld id="{241EB5C9-1307-BA42-ABA2-0BC069CD8E7F}" type="datetimeFigureOut">
               <a:rPr lang="en-US" smtClean="0"/>
-              <a:t>2/17/2018</a:t>
+              <a:t>4/5/2019</a:t>
             </a:fld>
             <a:endParaRPr lang="en-US"/>
           </a:p>
@@ -6062,7 +6062,7 @@
           <a:p>
             <a:fld id="{241EB5C9-1307-BA42-ABA2-0BC069CD8E7F}" type="datetimeFigureOut">
               <a:rPr lang="en-US" smtClean="0"/>
-              <a:t>2/17/2018</a:t>
+              <a:t>4/5/2019</a:t>
             </a:fld>
             <a:endParaRPr lang="en-US"/>
           </a:p>
@@ -6242,7 +6242,7 @@
           <a:p>
             <a:fld id="{241EB5C9-1307-BA42-ABA2-0BC069CD8E7F}" type="datetimeFigureOut">
               <a:rPr lang="en-US" smtClean="0"/>
-              <a:t>2/17/2018</a:t>
+              <a:t>4/5/2019</a:t>
             </a:fld>
             <a:endParaRPr lang="en-US"/>
           </a:p>
@@ -6412,7 +6412,7 @@
           <a:p>
             <a:fld id="{241EB5C9-1307-BA42-ABA2-0BC069CD8E7F}" type="datetimeFigureOut">
               <a:rPr lang="en-US" smtClean="0"/>
-              <a:t>2/17/2018</a:t>
+              <a:t>4/5/2019</a:t>
             </a:fld>
             <a:endParaRPr lang="en-US"/>
           </a:p>
@@ -6658,7 +6658,7 @@
           <a:p>
             <a:fld id="{241EB5C9-1307-BA42-ABA2-0BC069CD8E7F}" type="datetimeFigureOut">
               <a:rPr lang="en-US" smtClean="0"/>
-              <a:t>2/17/2018</a:t>
+              <a:t>4/5/2019</a:t>
             </a:fld>
             <a:endParaRPr lang="en-US"/>
           </a:p>
@@ -6946,7 +6946,7 @@
           <a:p>
             <a:fld id="{241EB5C9-1307-BA42-ABA2-0BC069CD8E7F}" type="datetimeFigureOut">
               <a:rPr lang="en-US" smtClean="0"/>
-              <a:t>2/17/2018</a:t>
+              <a:t>4/5/2019</a:t>
             </a:fld>
             <a:endParaRPr lang="en-US"/>
           </a:p>
@@ -7368,7 +7368,7 @@
           <a:p>
             <a:fld id="{241EB5C9-1307-BA42-ABA2-0BC069CD8E7F}" type="datetimeFigureOut">
               <a:rPr lang="en-US" smtClean="0"/>
-              <a:t>2/17/2018</a:t>
+              <a:t>4/5/2019</a:t>
             </a:fld>
             <a:endParaRPr lang="en-US"/>
           </a:p>
@@ -7486,7 +7486,7 @@
           <a:p>
             <a:fld id="{241EB5C9-1307-BA42-ABA2-0BC069CD8E7F}" type="datetimeFigureOut">
               <a:rPr lang="en-US" smtClean="0"/>
-              <a:t>2/17/2018</a:t>
+              <a:t>4/5/2019</a:t>
             </a:fld>
             <a:endParaRPr lang="en-US"/>
           </a:p>
@@ -7581,7 +7581,7 @@
           <a:p>
             <a:fld id="{241EB5C9-1307-BA42-ABA2-0BC069CD8E7F}" type="datetimeFigureOut">
               <a:rPr lang="en-US" smtClean="0"/>
-              <a:t>2/17/2018</a:t>
+              <a:t>4/5/2019</a:t>
             </a:fld>
             <a:endParaRPr lang="en-US"/>
           </a:p>
@@ -7858,7 +7858,7 @@
           <a:p>
             <a:fld id="{241EB5C9-1307-BA42-ABA2-0BC069CD8E7F}" type="datetimeFigureOut">
               <a:rPr lang="en-US" smtClean="0"/>
-              <a:t>2/17/2018</a:t>
+              <a:t>4/5/2019</a:t>
             </a:fld>
             <a:endParaRPr lang="en-US"/>
           </a:p>
@@ -8111,7 +8111,7 @@
           <a:p>
             <a:fld id="{241EB5C9-1307-BA42-ABA2-0BC069CD8E7F}" type="datetimeFigureOut">
               <a:rPr lang="en-US" smtClean="0"/>
-              <a:t>2/17/2018</a:t>
+              <a:t>4/5/2019</a:t>
             </a:fld>
             <a:endParaRPr lang="en-US"/>
           </a:p>
@@ -8324,7 +8324,7 @@
           <a:p>
             <a:fld id="{241EB5C9-1307-BA42-ABA2-0BC069CD8E7F}" type="datetimeFigureOut">
               <a:rPr lang="en-US" smtClean="0"/>
-              <a:t>2/17/2018</a:t>
+              <a:t>4/5/2019</a:t>
             </a:fld>
             <a:endParaRPr lang="en-US"/>
           </a:p>

</xml_diff>